<commit_message>
Context 2 Preview Added
</commit_message>
<xml_diff>
--- a/Project/Context/CancerColorrectal.Context.pptx
+++ b/Project/Context/CancerColorrectal.Context.pptx
@@ -12,25 +12,26 @@
     <p:sldId id="260" r:id="rId10"/>
     <p:sldId id="261" r:id="rId11"/>
     <p:sldId id="262" r:id="rId12"/>
+    <p:sldId id="263" r:id="rId13"/>
   </p:sldIdLst>
   <p:sldSz cx="18288000" cy="10287000"/>
   <p:notesSz cx="6858000" cy="9144000"/>
   <p:embeddedFontLst>
     <p:embeddedFont>
       <p:font typeface="Ahkio" charset="1" panose="00000000000000000000"/>
-      <p:regular r:id="rId13"/>
+      <p:regular r:id="rId14"/>
     </p:embeddedFont>
     <p:embeddedFont>
       <p:font typeface="Ahkio Thin" charset="1" panose="00000000000000000000"/>
-      <p:regular r:id="rId14"/>
+      <p:regular r:id="rId15"/>
     </p:embeddedFont>
     <p:embeddedFont>
       <p:font typeface="Ahkio Bold" charset="1" panose="00000000000000000000"/>
-      <p:regular r:id="rId15"/>
+      <p:regular r:id="rId16"/>
     </p:embeddedFont>
     <p:embeddedFont>
       <p:font typeface="Ahkio Light" charset="1" panose="00000000000000000000"/>
-      <p:regular r:id="rId16"/>
+      <p:regular r:id="rId17"/>
     </p:embeddedFont>
   </p:embeddedFontLst>
   <p:defaultTextStyle>
@@ -6939,6 +6940,914 @@
         </p:nvSpPr>
         <p:spPr>
           <a:xfrm flipH="false" flipV="false" rot="0">
+            <a:off x="406527" y="3202061"/>
+            <a:ext cx="6115037" cy="6115037"/>
+          </a:xfrm>
+          <a:custGeom>
+            <a:avLst/>
+            <a:gdLst/>
+            <a:ahLst/>
+            <a:cxnLst/>
+            <a:rect r="r" b="b" t="t" l="l"/>
+            <a:pathLst>
+              <a:path h="6115037" w="6115037">
+                <a:moveTo>
+                  <a:pt x="0" y="0"/>
+                </a:moveTo>
+                <a:lnTo>
+                  <a:pt x="6115037" y="0"/>
+                </a:lnTo>
+                <a:lnTo>
+                  <a:pt x="6115037" y="6115038"/>
+                </a:lnTo>
+                <a:lnTo>
+                  <a:pt x="0" y="6115038"/>
+                </a:lnTo>
+                <a:lnTo>
+                  <a:pt x="0" y="0"/>
+                </a:lnTo>
+                <a:close/>
+              </a:path>
+            </a:pathLst>
+          </a:custGeom>
+          <a:blipFill>
+            <a:blip r:embed="rId3">
+              <a:extLst>
+                <a:ext uri="{96DAC541-7B7A-43D3-8B79-37D633B846F1}">
+                  <asvg:svgBlip xmlns:asvg="http://schemas.microsoft.com/office/drawing/2016/SVG/main" r:embed="rId4"/>
+                </a:ext>
+              </a:extLst>
+            </a:blip>
+            <a:stretch>
+              <a:fillRect l="0" t="0" r="0" b="0"/>
+            </a:stretch>
+          </a:blipFill>
+        </p:spPr>
+      </p:sp>
+      <p:sp>
+        <p:nvSpPr>
+          <p:cNvPr name="Freeform 5" id="5"/>
+          <p:cNvSpPr/>
+          <p:nvPr/>
+        </p:nvSpPr>
+        <p:spPr>
+          <a:xfrm flipH="false" flipV="false" rot="0">
+            <a:off x="3622460" y="0"/>
+            <a:ext cx="5245361" cy="5245361"/>
+          </a:xfrm>
+          <a:custGeom>
+            <a:avLst/>
+            <a:gdLst/>
+            <a:ahLst/>
+            <a:cxnLst/>
+            <a:rect r="r" b="b" t="t" l="l"/>
+            <a:pathLst>
+              <a:path h="5245361" w="5245361">
+                <a:moveTo>
+                  <a:pt x="0" y="0"/>
+                </a:moveTo>
+                <a:lnTo>
+                  <a:pt x="5245361" y="0"/>
+                </a:lnTo>
+                <a:lnTo>
+                  <a:pt x="5245361" y="5245361"/>
+                </a:lnTo>
+                <a:lnTo>
+                  <a:pt x="0" y="5245361"/>
+                </a:lnTo>
+                <a:lnTo>
+                  <a:pt x="0" y="0"/>
+                </a:lnTo>
+                <a:close/>
+              </a:path>
+            </a:pathLst>
+          </a:custGeom>
+          <a:blipFill>
+            <a:blip r:embed="rId2">
+              <a:alphaModFix amt="37000"/>
+            </a:blip>
+            <a:stretch>
+              <a:fillRect l="0" t="0" r="0" b="0"/>
+            </a:stretch>
+          </a:blipFill>
+        </p:spPr>
+      </p:sp>
+      <p:sp>
+        <p:nvSpPr>
+          <p:cNvPr name="Freeform 6" id="6"/>
+          <p:cNvSpPr/>
+          <p:nvPr/>
+        </p:nvSpPr>
+        <p:spPr>
+          <a:xfrm flipH="false" flipV="false" rot="0">
+            <a:off x="-1085198" y="0"/>
+            <a:ext cx="5245361" cy="5245361"/>
+          </a:xfrm>
+          <a:custGeom>
+            <a:avLst/>
+            <a:gdLst/>
+            <a:ahLst/>
+            <a:cxnLst/>
+            <a:rect r="r" b="b" t="t" l="l"/>
+            <a:pathLst>
+              <a:path h="5245361" w="5245361">
+                <a:moveTo>
+                  <a:pt x="0" y="0"/>
+                </a:moveTo>
+                <a:lnTo>
+                  <a:pt x="5245361" y="0"/>
+                </a:lnTo>
+                <a:lnTo>
+                  <a:pt x="5245361" y="5245361"/>
+                </a:lnTo>
+                <a:lnTo>
+                  <a:pt x="0" y="5245361"/>
+                </a:lnTo>
+                <a:lnTo>
+                  <a:pt x="0" y="0"/>
+                </a:lnTo>
+                <a:close/>
+              </a:path>
+            </a:pathLst>
+          </a:custGeom>
+          <a:blipFill>
+            <a:blip r:embed="rId2">
+              <a:alphaModFix amt="37000"/>
+            </a:blip>
+            <a:stretch>
+              <a:fillRect l="0" t="0" r="0" b="0"/>
+            </a:stretch>
+          </a:blipFill>
+        </p:spPr>
+      </p:sp>
+      <p:sp>
+        <p:nvSpPr>
+          <p:cNvPr name="Freeform 7" id="7"/>
+          <p:cNvSpPr/>
+          <p:nvPr/>
+        </p:nvSpPr>
+        <p:spPr>
+          <a:xfrm flipH="false" flipV="false" rot="0">
+            <a:off x="13042639" y="5245361"/>
+            <a:ext cx="5245361" cy="5245361"/>
+          </a:xfrm>
+          <a:custGeom>
+            <a:avLst/>
+            <a:gdLst/>
+            <a:ahLst/>
+            <a:cxnLst/>
+            <a:rect r="r" b="b" t="t" l="l"/>
+            <a:pathLst>
+              <a:path h="5245361" w="5245361">
+                <a:moveTo>
+                  <a:pt x="0" y="0"/>
+                </a:moveTo>
+                <a:lnTo>
+                  <a:pt x="5245361" y="0"/>
+                </a:lnTo>
+                <a:lnTo>
+                  <a:pt x="5245361" y="5245362"/>
+                </a:lnTo>
+                <a:lnTo>
+                  <a:pt x="0" y="5245362"/>
+                </a:lnTo>
+                <a:lnTo>
+                  <a:pt x="0" y="0"/>
+                </a:lnTo>
+                <a:close/>
+              </a:path>
+            </a:pathLst>
+          </a:custGeom>
+          <a:blipFill>
+            <a:blip r:embed="rId2">
+              <a:alphaModFix amt="37000"/>
+            </a:blip>
+            <a:stretch>
+              <a:fillRect l="0" t="0" r="0" b="0"/>
+            </a:stretch>
+          </a:blipFill>
+        </p:spPr>
+      </p:sp>
+      <p:sp>
+        <p:nvSpPr>
+          <p:cNvPr name="Freeform 8" id="8"/>
+          <p:cNvSpPr/>
+          <p:nvPr/>
+        </p:nvSpPr>
+        <p:spPr>
+          <a:xfrm flipH="false" flipV="false" rot="0">
+            <a:off x="8330280" y="5245361"/>
+            <a:ext cx="5245361" cy="5245361"/>
+          </a:xfrm>
+          <a:custGeom>
+            <a:avLst/>
+            <a:gdLst/>
+            <a:ahLst/>
+            <a:cxnLst/>
+            <a:rect r="r" b="b" t="t" l="l"/>
+            <a:pathLst>
+              <a:path h="5245361" w="5245361">
+                <a:moveTo>
+                  <a:pt x="0" y="0"/>
+                </a:moveTo>
+                <a:lnTo>
+                  <a:pt x="5245362" y="0"/>
+                </a:lnTo>
+                <a:lnTo>
+                  <a:pt x="5245362" y="5245362"/>
+                </a:lnTo>
+                <a:lnTo>
+                  <a:pt x="0" y="5245362"/>
+                </a:lnTo>
+                <a:lnTo>
+                  <a:pt x="0" y="0"/>
+                </a:lnTo>
+                <a:close/>
+              </a:path>
+            </a:pathLst>
+          </a:custGeom>
+          <a:blipFill>
+            <a:blip r:embed="rId2">
+              <a:alphaModFix amt="37000"/>
+            </a:blip>
+            <a:stretch>
+              <a:fillRect l="0" t="0" r="0" b="0"/>
+            </a:stretch>
+          </a:blipFill>
+        </p:spPr>
+      </p:sp>
+      <p:sp>
+        <p:nvSpPr>
+          <p:cNvPr name="Freeform 9" id="9"/>
+          <p:cNvSpPr/>
+          <p:nvPr/>
+        </p:nvSpPr>
+        <p:spPr>
+          <a:xfrm flipH="false" flipV="false" rot="0">
+            <a:off x="3622460" y="5245361"/>
+            <a:ext cx="5245361" cy="5245361"/>
+          </a:xfrm>
+          <a:custGeom>
+            <a:avLst/>
+            <a:gdLst/>
+            <a:ahLst/>
+            <a:cxnLst/>
+            <a:rect r="r" b="b" t="t" l="l"/>
+            <a:pathLst>
+              <a:path h="5245361" w="5245361">
+                <a:moveTo>
+                  <a:pt x="0" y="0"/>
+                </a:moveTo>
+                <a:lnTo>
+                  <a:pt x="5245361" y="0"/>
+                </a:lnTo>
+                <a:lnTo>
+                  <a:pt x="5245361" y="5245362"/>
+                </a:lnTo>
+                <a:lnTo>
+                  <a:pt x="0" y="5245362"/>
+                </a:lnTo>
+                <a:lnTo>
+                  <a:pt x="0" y="0"/>
+                </a:lnTo>
+                <a:close/>
+              </a:path>
+            </a:pathLst>
+          </a:custGeom>
+          <a:blipFill>
+            <a:blip r:embed="rId2">
+              <a:alphaModFix amt="37000"/>
+            </a:blip>
+            <a:stretch>
+              <a:fillRect l="0" t="0" r="0" b="0"/>
+            </a:stretch>
+          </a:blipFill>
+        </p:spPr>
+      </p:sp>
+      <p:sp>
+        <p:nvSpPr>
+          <p:cNvPr name="Freeform 10" id="10"/>
+          <p:cNvSpPr/>
+          <p:nvPr/>
+        </p:nvSpPr>
+        <p:spPr>
+          <a:xfrm flipH="false" flipV="false" rot="0">
+            <a:off x="-1085198" y="5245361"/>
+            <a:ext cx="5245361" cy="5245361"/>
+          </a:xfrm>
+          <a:custGeom>
+            <a:avLst/>
+            <a:gdLst/>
+            <a:ahLst/>
+            <a:cxnLst/>
+            <a:rect r="r" b="b" t="t" l="l"/>
+            <a:pathLst>
+              <a:path h="5245361" w="5245361">
+                <a:moveTo>
+                  <a:pt x="0" y="0"/>
+                </a:moveTo>
+                <a:lnTo>
+                  <a:pt x="5245361" y="0"/>
+                </a:lnTo>
+                <a:lnTo>
+                  <a:pt x="5245361" y="5245362"/>
+                </a:lnTo>
+                <a:lnTo>
+                  <a:pt x="0" y="5245362"/>
+                </a:lnTo>
+                <a:lnTo>
+                  <a:pt x="0" y="0"/>
+                </a:lnTo>
+                <a:close/>
+              </a:path>
+            </a:pathLst>
+          </a:custGeom>
+          <a:blipFill>
+            <a:blip r:embed="rId2">
+              <a:alphaModFix amt="37000"/>
+            </a:blip>
+            <a:stretch>
+              <a:fillRect l="0" t="0" r="0" b="0"/>
+            </a:stretch>
+          </a:blipFill>
+        </p:spPr>
+      </p:sp>
+      <p:sp>
+        <p:nvSpPr>
+          <p:cNvPr name="Freeform 11" id="11"/>
+          <p:cNvSpPr/>
+          <p:nvPr/>
+        </p:nvSpPr>
+        <p:spPr>
+          <a:xfrm flipH="false" flipV="false" rot="0">
+            <a:off x="-1540493" y="-209596"/>
+            <a:ext cx="4481465" cy="4114800"/>
+          </a:xfrm>
+          <a:custGeom>
+            <a:avLst/>
+            <a:gdLst/>
+            <a:ahLst/>
+            <a:cxnLst/>
+            <a:rect r="r" b="b" t="t" l="l"/>
+            <a:pathLst>
+              <a:path h="4114800" w="4481465">
+                <a:moveTo>
+                  <a:pt x="0" y="0"/>
+                </a:moveTo>
+                <a:lnTo>
+                  <a:pt x="4481466" y="0"/>
+                </a:lnTo>
+                <a:lnTo>
+                  <a:pt x="4481466" y="4114800"/>
+                </a:lnTo>
+                <a:lnTo>
+                  <a:pt x="0" y="4114800"/>
+                </a:lnTo>
+                <a:lnTo>
+                  <a:pt x="0" y="0"/>
+                </a:lnTo>
+                <a:close/>
+              </a:path>
+            </a:pathLst>
+          </a:custGeom>
+          <a:blipFill>
+            <a:blip r:embed="rId5">
+              <a:extLst>
+                <a:ext uri="{96DAC541-7B7A-43D3-8B79-37D633B846F1}">
+                  <asvg:svgBlip xmlns:asvg="http://schemas.microsoft.com/office/drawing/2016/SVG/main" r:embed="rId6"/>
+                </a:ext>
+              </a:extLst>
+            </a:blip>
+            <a:stretch>
+              <a:fillRect l="0" t="0" r="0" b="0"/>
+            </a:stretch>
+          </a:blipFill>
+        </p:spPr>
+      </p:sp>
+      <p:sp>
+        <p:nvSpPr>
+          <p:cNvPr name="Freeform 12" id="12"/>
+          <p:cNvSpPr/>
+          <p:nvPr/>
+        </p:nvSpPr>
+        <p:spPr>
+          <a:xfrm flipH="false" flipV="false" rot="0">
+            <a:off x="15910140" y="8238184"/>
+            <a:ext cx="3930896" cy="2637274"/>
+          </a:xfrm>
+          <a:custGeom>
+            <a:avLst/>
+            <a:gdLst/>
+            <a:ahLst/>
+            <a:cxnLst/>
+            <a:rect r="r" b="b" t="t" l="l"/>
+            <a:pathLst>
+              <a:path h="2637274" w="3930896">
+                <a:moveTo>
+                  <a:pt x="0" y="0"/>
+                </a:moveTo>
+                <a:lnTo>
+                  <a:pt x="3930896" y="0"/>
+                </a:lnTo>
+                <a:lnTo>
+                  <a:pt x="3930896" y="2637273"/>
+                </a:lnTo>
+                <a:lnTo>
+                  <a:pt x="0" y="2637273"/>
+                </a:lnTo>
+                <a:lnTo>
+                  <a:pt x="0" y="0"/>
+                </a:lnTo>
+                <a:close/>
+              </a:path>
+            </a:pathLst>
+          </a:custGeom>
+          <a:blipFill>
+            <a:blip r:embed="rId7">
+              <a:extLst>
+                <a:ext uri="{96DAC541-7B7A-43D3-8B79-37D633B846F1}">
+                  <asvg:svgBlip xmlns:asvg="http://schemas.microsoft.com/office/drawing/2016/SVG/main" r:embed="rId8"/>
+                </a:ext>
+              </a:extLst>
+            </a:blip>
+            <a:stretch>
+              <a:fillRect l="0" t="0" r="0" b="0"/>
+            </a:stretch>
+          </a:blipFill>
+        </p:spPr>
+      </p:sp>
+      <p:sp>
+        <p:nvSpPr>
+          <p:cNvPr name="Freeform 13" id="13"/>
+          <p:cNvSpPr/>
+          <p:nvPr/>
+        </p:nvSpPr>
+        <p:spPr>
+          <a:xfrm flipH="false" flipV="false" rot="0">
+            <a:off x="10762892" y="5899040"/>
+            <a:ext cx="2812750" cy="2812750"/>
+          </a:xfrm>
+          <a:custGeom>
+            <a:avLst/>
+            <a:gdLst/>
+            <a:ahLst/>
+            <a:cxnLst/>
+            <a:rect r="r" b="b" t="t" l="l"/>
+            <a:pathLst>
+              <a:path h="2812750" w="2812750">
+                <a:moveTo>
+                  <a:pt x="0" y="0"/>
+                </a:moveTo>
+                <a:lnTo>
+                  <a:pt x="2812750" y="0"/>
+                </a:lnTo>
+                <a:lnTo>
+                  <a:pt x="2812750" y="2812749"/>
+                </a:lnTo>
+                <a:lnTo>
+                  <a:pt x="0" y="2812749"/>
+                </a:lnTo>
+                <a:lnTo>
+                  <a:pt x="0" y="0"/>
+                </a:lnTo>
+                <a:close/>
+              </a:path>
+            </a:pathLst>
+          </a:custGeom>
+          <a:blipFill>
+            <a:blip r:embed="rId9"/>
+            <a:stretch>
+              <a:fillRect l="0" t="0" r="0" b="0"/>
+            </a:stretch>
+          </a:blipFill>
+        </p:spPr>
+      </p:sp>
+      <p:sp>
+        <p:nvSpPr>
+          <p:cNvPr name="Freeform 14" id="14"/>
+          <p:cNvSpPr/>
+          <p:nvPr/>
+        </p:nvSpPr>
+        <p:spPr>
+          <a:xfrm flipH="false" flipV="false" rot="0">
+            <a:off x="14448348" y="2820003"/>
+            <a:ext cx="1972073" cy="1972073"/>
+          </a:xfrm>
+          <a:custGeom>
+            <a:avLst/>
+            <a:gdLst/>
+            <a:ahLst/>
+            <a:cxnLst/>
+            <a:rect r="r" b="b" t="t" l="l"/>
+            <a:pathLst>
+              <a:path h="1972073" w="1972073">
+                <a:moveTo>
+                  <a:pt x="0" y="0"/>
+                </a:moveTo>
+                <a:lnTo>
+                  <a:pt x="1972073" y="0"/>
+                </a:lnTo>
+                <a:lnTo>
+                  <a:pt x="1972073" y="1972073"/>
+                </a:lnTo>
+                <a:lnTo>
+                  <a:pt x="0" y="1972073"/>
+                </a:lnTo>
+                <a:lnTo>
+                  <a:pt x="0" y="0"/>
+                </a:lnTo>
+                <a:close/>
+              </a:path>
+            </a:pathLst>
+          </a:custGeom>
+          <a:blipFill>
+            <a:blip r:embed="rId10"/>
+            <a:stretch>
+              <a:fillRect l="0" t="0" r="0" b="0"/>
+            </a:stretch>
+          </a:blipFill>
+        </p:spPr>
+      </p:sp>
+      <p:sp>
+        <p:nvSpPr>
+          <p:cNvPr name="Freeform 15" id="15"/>
+          <p:cNvSpPr/>
+          <p:nvPr/>
+        </p:nvSpPr>
+        <p:spPr>
+          <a:xfrm flipH="true" flipV="false" rot="0">
+            <a:off x="7296983" y="2820003"/>
+            <a:ext cx="2690491" cy="2690491"/>
+          </a:xfrm>
+          <a:custGeom>
+            <a:avLst/>
+            <a:gdLst/>
+            <a:ahLst/>
+            <a:cxnLst/>
+            <a:rect r="r" b="b" t="t" l="l"/>
+            <a:pathLst>
+              <a:path h="2690491" w="2690491">
+                <a:moveTo>
+                  <a:pt x="2690491" y="0"/>
+                </a:moveTo>
+                <a:lnTo>
+                  <a:pt x="0" y="0"/>
+                </a:lnTo>
+                <a:lnTo>
+                  <a:pt x="0" y="2690491"/>
+                </a:lnTo>
+                <a:lnTo>
+                  <a:pt x="2690491" y="2690491"/>
+                </a:lnTo>
+                <a:lnTo>
+                  <a:pt x="2690491" y="0"/>
+                </a:lnTo>
+                <a:close/>
+              </a:path>
+            </a:pathLst>
+          </a:custGeom>
+          <a:blipFill>
+            <a:blip r:embed="rId11"/>
+            <a:stretch>
+              <a:fillRect l="0" t="0" r="0" b="0"/>
+            </a:stretch>
+          </a:blipFill>
+        </p:spPr>
+      </p:sp>
+      <p:sp>
+        <p:nvSpPr>
+          <p:cNvPr name="Freeform 16" id="16"/>
+          <p:cNvSpPr/>
+          <p:nvPr/>
+        </p:nvSpPr>
+        <p:spPr>
+          <a:xfrm flipH="false" flipV="false" rot="0">
+            <a:off x="1537482" y="4165248"/>
+            <a:ext cx="1534259" cy="2052520"/>
+          </a:xfrm>
+          <a:custGeom>
+            <a:avLst/>
+            <a:gdLst/>
+            <a:ahLst/>
+            <a:cxnLst/>
+            <a:rect r="r" b="b" t="t" l="l"/>
+            <a:pathLst>
+              <a:path h="2052520" w="1534259">
+                <a:moveTo>
+                  <a:pt x="0" y="0"/>
+                </a:moveTo>
+                <a:lnTo>
+                  <a:pt x="1534259" y="0"/>
+                </a:lnTo>
+                <a:lnTo>
+                  <a:pt x="1534259" y="2052520"/>
+                </a:lnTo>
+                <a:lnTo>
+                  <a:pt x="0" y="2052520"/>
+                </a:lnTo>
+                <a:lnTo>
+                  <a:pt x="0" y="0"/>
+                </a:lnTo>
+                <a:close/>
+              </a:path>
+            </a:pathLst>
+          </a:custGeom>
+          <a:blipFill>
+            <a:blip r:embed="rId12"/>
+            <a:stretch>
+              <a:fillRect l="0" t="0" r="0" b="0"/>
+            </a:stretch>
+          </a:blipFill>
+        </p:spPr>
+      </p:sp>
+      <p:sp>
+        <p:nvSpPr>
+          <p:cNvPr name="Freeform 17" id="17"/>
+          <p:cNvSpPr/>
+          <p:nvPr/>
+        </p:nvSpPr>
+        <p:spPr>
+          <a:xfrm flipH="false" flipV="false" rot="0">
+            <a:off x="2777098" y="5666889"/>
+            <a:ext cx="2330236" cy="2571295"/>
+          </a:xfrm>
+          <a:custGeom>
+            <a:avLst/>
+            <a:gdLst/>
+            <a:ahLst/>
+            <a:cxnLst/>
+            <a:rect r="r" b="b" t="t" l="l"/>
+            <a:pathLst>
+              <a:path h="2571295" w="2330236">
+                <a:moveTo>
+                  <a:pt x="0" y="0"/>
+                </a:moveTo>
+                <a:lnTo>
+                  <a:pt x="2330236" y="0"/>
+                </a:lnTo>
+                <a:lnTo>
+                  <a:pt x="2330236" y="2571295"/>
+                </a:lnTo>
+                <a:lnTo>
+                  <a:pt x="0" y="2571295"/>
+                </a:lnTo>
+                <a:lnTo>
+                  <a:pt x="0" y="0"/>
+                </a:lnTo>
+                <a:close/>
+              </a:path>
+            </a:pathLst>
+          </a:custGeom>
+          <a:blipFill>
+            <a:blip r:embed="rId13"/>
+            <a:stretch>
+              <a:fillRect l="0" t="0" r="0" b="0"/>
+            </a:stretch>
+          </a:blipFill>
+        </p:spPr>
+      </p:sp>
+      <p:sp>
+        <p:nvSpPr>
+          <p:cNvPr name="TextBox 18" id="18"/>
+          <p:cNvSpPr txBox="true"/>
+          <p:nvPr/>
+        </p:nvSpPr>
+        <p:spPr>
+          <a:xfrm rot="0">
+            <a:off x="5282187" y="348665"/>
+            <a:ext cx="7723627" cy="1663593"/>
+          </a:xfrm>
+          <a:prstGeom prst="rect">
+            <a:avLst/>
+          </a:prstGeom>
+        </p:spPr>
+        <p:txBody>
+          <a:bodyPr anchor="t" rtlCol="false" tIns="0" lIns="0" bIns="0" rIns="0">
+            <a:spAutoFit/>
+          </a:bodyPr>
+          <a:lstStyle/>
+          <a:p>
+            <a:pPr algn="ctr">
+              <a:lnSpc>
+                <a:spcPts val="13307"/>
+              </a:lnSpc>
+            </a:pPr>
+            <a:r>
+              <a:rPr lang="en-US" sz="9505">
+                <a:solidFill>
+                  <a:srgbClr val="000000"/>
+                </a:solidFill>
+                <a:latin typeface="Ahkio"/>
+                <a:ea typeface="Ahkio"/>
+                <a:cs typeface="Ahkio"/>
+                <a:sym typeface="Ahkio"/>
+              </a:rPr>
+              <a:t>CONTEXTO</a:t>
+            </a:r>
+          </a:p>
+        </p:txBody>
+      </p:sp>
+      <p:sp>
+        <p:nvSpPr>
+          <p:cNvPr name="AutoShape 19" id="19"/>
+          <p:cNvSpPr/>
+          <p:nvPr/>
+        </p:nvSpPr>
+        <p:spPr>
+          <a:xfrm flipV="true">
+            <a:off x="6203006" y="4969142"/>
+            <a:ext cx="1653814" cy="392305"/>
+          </a:xfrm>
+          <a:prstGeom prst="line">
+            <a:avLst/>
+          </a:prstGeom>
+          <a:ln cap="flat" w="114300">
+            <a:solidFill>
+              <a:srgbClr val="000000"/>
+            </a:solidFill>
+            <a:prstDash val="solid"/>
+            <a:headEnd type="none" len="sm" w="sm"/>
+            <a:tailEnd type="arrow" len="sm" w="med"/>
+          </a:ln>
+        </p:spPr>
+      </p:sp>
+      <p:sp>
+        <p:nvSpPr>
+          <p:cNvPr name="AutoShape 20" id="20"/>
+          <p:cNvSpPr/>
+          <p:nvPr/>
+        </p:nvSpPr>
+        <p:spPr>
+          <a:xfrm>
+            <a:off x="9493845" y="5245361"/>
+            <a:ext cx="1704942" cy="621914"/>
+          </a:xfrm>
+          <a:prstGeom prst="line">
+            <a:avLst/>
+          </a:prstGeom>
+          <a:ln cap="flat" w="114300">
+            <a:solidFill>
+              <a:srgbClr val="000000"/>
+            </a:solidFill>
+            <a:prstDash val="solid"/>
+            <a:headEnd type="arrow" len="sm" w="med"/>
+            <a:tailEnd type="arrow" len="sm" w="med"/>
+          </a:ln>
+        </p:spPr>
+      </p:sp>
+      <p:sp>
+        <p:nvSpPr>
+          <p:cNvPr name="AutoShape 21" id="21"/>
+          <p:cNvSpPr/>
+          <p:nvPr/>
+        </p:nvSpPr>
+        <p:spPr>
+          <a:xfrm flipV="true">
+            <a:off x="13133399" y="4515840"/>
+            <a:ext cx="1595968" cy="1383200"/>
+          </a:xfrm>
+          <a:prstGeom prst="line">
+            <a:avLst/>
+          </a:prstGeom>
+          <a:ln cap="flat" w="114300">
+            <a:solidFill>
+              <a:srgbClr val="000000"/>
+            </a:solidFill>
+            <a:prstDash val="solid"/>
+            <a:headEnd type="arrow" len="sm" w="med"/>
+            <a:tailEnd type="arrow" len="sm" w="med"/>
+          </a:ln>
+        </p:spPr>
+      </p:sp>
+    </p:spTree>
+  </p:cSld>
+  <p:clrMapOvr>
+    <a:masterClrMapping/>
+  </p:clrMapOvr>
+</p:sld>
+</file>
+
+<file path=ppt/slides/slide5.xml><?xml version="1.0" encoding="utf-8"?>
+<p:sld xmlns:p="http://schemas.openxmlformats.org/presentationml/2006/main" xmlns:a="http://schemas.openxmlformats.org/drawingml/2006/main" xmlns:r="http://schemas.openxmlformats.org/officeDocument/2006/relationships">
+  <p:cSld>
+    <p:spTree>
+      <p:nvGrpSpPr>
+        <p:cNvPr id="1" name=""/>
+        <p:cNvGrpSpPr/>
+        <p:nvPr/>
+      </p:nvGrpSpPr>
+      <p:grpSpPr>
+        <a:xfrm>
+          <a:off x="0" y="0"/>
+          <a:ext cx="0" cy="0"/>
+          <a:chOff x="0" y="0"/>
+          <a:chExt cx="0" cy="0"/>
+        </a:xfrm>
+      </p:grpSpPr>
+      <p:sp>
+        <p:nvSpPr>
+          <p:cNvPr name="Freeform 2" id="2"/>
+          <p:cNvSpPr/>
+          <p:nvPr/>
+        </p:nvSpPr>
+        <p:spPr>
+          <a:xfrm flipH="false" flipV="false" rot="0">
+            <a:off x="13042639" y="0"/>
+            <a:ext cx="5245361" cy="5245361"/>
+          </a:xfrm>
+          <a:custGeom>
+            <a:avLst/>
+            <a:gdLst/>
+            <a:ahLst/>
+            <a:cxnLst/>
+            <a:rect r="r" b="b" t="t" l="l"/>
+            <a:pathLst>
+              <a:path h="5245361" w="5245361">
+                <a:moveTo>
+                  <a:pt x="0" y="0"/>
+                </a:moveTo>
+                <a:lnTo>
+                  <a:pt x="5245361" y="0"/>
+                </a:lnTo>
+                <a:lnTo>
+                  <a:pt x="5245361" y="5245361"/>
+                </a:lnTo>
+                <a:lnTo>
+                  <a:pt x="0" y="5245361"/>
+                </a:lnTo>
+                <a:lnTo>
+                  <a:pt x="0" y="0"/>
+                </a:lnTo>
+                <a:close/>
+              </a:path>
+            </a:pathLst>
+          </a:custGeom>
+          <a:blipFill>
+            <a:blip r:embed="rId2">
+              <a:alphaModFix amt="37000"/>
+            </a:blip>
+            <a:stretch>
+              <a:fillRect l="0" t="0" r="0" b="0"/>
+            </a:stretch>
+          </a:blipFill>
+        </p:spPr>
+      </p:sp>
+      <p:sp>
+        <p:nvSpPr>
+          <p:cNvPr name="Freeform 3" id="3"/>
+          <p:cNvSpPr/>
+          <p:nvPr/>
+        </p:nvSpPr>
+        <p:spPr>
+          <a:xfrm flipH="false" flipV="false" rot="0">
+            <a:off x="8330280" y="0"/>
+            <a:ext cx="5245361" cy="5245361"/>
+          </a:xfrm>
+          <a:custGeom>
+            <a:avLst/>
+            <a:gdLst/>
+            <a:ahLst/>
+            <a:cxnLst/>
+            <a:rect r="r" b="b" t="t" l="l"/>
+            <a:pathLst>
+              <a:path h="5245361" w="5245361">
+                <a:moveTo>
+                  <a:pt x="0" y="0"/>
+                </a:moveTo>
+                <a:lnTo>
+                  <a:pt x="5245362" y="0"/>
+                </a:lnTo>
+                <a:lnTo>
+                  <a:pt x="5245362" y="5245361"/>
+                </a:lnTo>
+                <a:lnTo>
+                  <a:pt x="0" y="5245361"/>
+                </a:lnTo>
+                <a:lnTo>
+                  <a:pt x="0" y="0"/>
+                </a:lnTo>
+                <a:close/>
+              </a:path>
+            </a:pathLst>
+          </a:custGeom>
+          <a:blipFill>
+            <a:blip r:embed="rId2">
+              <a:alphaModFix amt="37000"/>
+            </a:blip>
+            <a:stretch>
+              <a:fillRect l="0" t="0" r="0" b="0"/>
+            </a:stretch>
+          </a:blipFill>
+        </p:spPr>
+      </p:sp>
+      <p:sp>
+        <p:nvSpPr>
+          <p:cNvPr name="Freeform 4" id="4"/>
+          <p:cNvSpPr/>
+          <p:nvPr/>
+        </p:nvSpPr>
+        <p:spPr>
+          <a:xfrm flipH="false" flipV="false" rot="0">
             <a:off x="3622460" y="0"/>
             <a:ext cx="5245361" cy="5245361"/>
           </a:xfrm>
@@ -7448,7 +8357,7 @@
 </p:sld>
 </file>
 
-<file path=ppt/slides/slide5.xml><?xml version="1.0" encoding="utf-8"?>
+<file path=ppt/slides/slide6.xml><?xml version="1.0" encoding="utf-8"?>
 <p:sld xmlns:p="http://schemas.openxmlformats.org/presentationml/2006/main" xmlns:a="http://schemas.openxmlformats.org/drawingml/2006/main" xmlns:r="http://schemas.openxmlformats.org/officeDocument/2006/relationships">
   <p:cSld>
     <p:spTree>
@@ -8163,7 +9072,7 @@
 </p:sld>
 </file>
 
-<file path=ppt/slides/slide6.xml><?xml version="1.0" encoding="utf-8"?>
+<file path=ppt/slides/slide7.xml><?xml version="1.0" encoding="utf-8"?>
 <p:sld xmlns:p="http://schemas.openxmlformats.org/presentationml/2006/main" xmlns:a="http://schemas.openxmlformats.org/drawingml/2006/main" xmlns:r="http://schemas.openxmlformats.org/officeDocument/2006/relationships">
   <p:cSld>
     <p:spTree>
@@ -8949,7 +9858,7 @@
 </p:sld>
 </file>
 
-<file path=ppt/slides/slide7.xml><?xml version="1.0" encoding="utf-8"?>
+<file path=ppt/slides/slide8.xml><?xml version="1.0" encoding="utf-8"?>
 <p:sld xmlns:p="http://schemas.openxmlformats.org/presentationml/2006/main" xmlns:a="http://schemas.openxmlformats.org/drawingml/2006/main" xmlns:r="http://schemas.openxmlformats.org/officeDocument/2006/relationships">
   <p:cSld>
     <p:spTree>

</xml_diff>

<commit_message>
Context 3 Preview Added
</commit_message>
<xml_diff>
--- a/Project/Context/CancerColorrectal.Context.pptx
+++ b/Project/Context/CancerColorrectal.Context.pptx
@@ -32,6 +32,10 @@
     <p:embeddedFont>
       <p:font typeface="Ahkio Light" charset="1" panose="00000000000000000000"/>
       <p:regular r:id="rId17"/>
+    </p:embeddedFont>
+    <p:embeddedFont>
+      <p:font typeface="Ahkio Heavy" charset="1" panose="00000000000000000000"/>
+      <p:regular r:id="rId18"/>
     </p:embeddedFont>
   </p:embeddedFontLst>
   <p:defaultTextStyle>
@@ -3629,7 +3633,7 @@
         <p:spPr>
           <a:xfrm flipH="false" flipV="false" rot="0">
             <a:off x="3279095" y="7370703"/>
-            <a:ext cx="2673049" cy="2393523"/>
+            <a:ext cx="2490102" cy="2229707"/>
           </a:xfrm>
           <a:custGeom>
             <a:avLst/>
@@ -3638,18 +3642,18 @@
             <a:cxnLst/>
             <a:rect r="r" b="b" t="t" l="l"/>
             <a:pathLst>
-              <a:path h="2393523" w="2673049">
+              <a:path h="2229707" w="2490102">
                 <a:moveTo>
                   <a:pt x="0" y="0"/>
                 </a:moveTo>
                 <a:lnTo>
-                  <a:pt x="2673049" y="0"/>
-                </a:lnTo>
-                <a:lnTo>
-                  <a:pt x="2673049" y="2393523"/>
-                </a:lnTo>
-                <a:lnTo>
-                  <a:pt x="0" y="2393523"/>
+                  <a:pt x="2490102" y="0"/>
+                </a:lnTo>
+                <a:lnTo>
+                  <a:pt x="2490102" y="2229707"/>
+                </a:lnTo>
+                <a:lnTo>
+                  <a:pt x="0" y="2229707"/>
                 </a:lnTo>
                 <a:lnTo>
                   <a:pt x="0" y="0"/>
@@ -4118,6 +4122,47 @@
             </a:stretch>
           </a:blipFill>
         </p:spPr>
+      </p:sp>
+      <p:sp>
+        <p:nvSpPr>
+          <p:cNvPr name="TextBox 27" id="27"/>
+          <p:cNvSpPr txBox="true"/>
+          <p:nvPr/>
+        </p:nvSpPr>
+        <p:spPr>
+          <a:xfrm rot="0">
+            <a:off x="153544" y="9659451"/>
+            <a:ext cx="9789975" cy="573099"/>
+          </a:xfrm>
+          <a:prstGeom prst="rect">
+            <a:avLst/>
+          </a:prstGeom>
+        </p:spPr>
+        <p:txBody>
+          <a:bodyPr anchor="t" rtlCol="false" tIns="0" lIns="0" bIns="0" rIns="0">
+            <a:spAutoFit/>
+          </a:bodyPr>
+          <a:lstStyle/>
+          <a:p>
+            <a:pPr algn="l">
+              <a:lnSpc>
+                <a:spcPts val="4690"/>
+              </a:lnSpc>
+            </a:pPr>
+            <a:r>
+              <a:rPr lang="en-US" sz="3105" spc="145">
+                <a:solidFill>
+                  <a:srgbClr val="000000"/>
+                </a:solidFill>
+                <a:latin typeface="Ahkio"/>
+                <a:ea typeface="Ahkio"/>
+                <a:cs typeface="Ahkio"/>
+                <a:sym typeface="Ahkio"/>
+              </a:rPr>
+              <a:t>David Alejandro Medina Ruiz       91769</a:t>
+            </a:r>
+          </a:p>
+        </p:txBody>
       </p:sp>
     </p:spTree>
   </p:cSld>
@@ -7332,7 +7377,7 @@
         </p:nvSpPr>
         <p:spPr>
           <a:xfrm flipH="false" flipV="false" rot="0">
-            <a:off x="15910140" y="8238184"/>
+            <a:off x="14907798" y="-1068159"/>
             <a:ext cx="3930896" cy="2637274"/>
           </a:xfrm>
           <a:custGeom>
@@ -7350,10 +7395,10 @@
                   <a:pt x="3930896" y="0"/>
                 </a:lnTo>
                 <a:lnTo>
-                  <a:pt x="3930896" y="2637273"/>
-                </a:lnTo>
-                <a:lnTo>
-                  <a:pt x="0" y="2637273"/>
+                  <a:pt x="3930896" y="2637274"/>
+                </a:lnTo>
+                <a:lnTo>
+                  <a:pt x="0" y="2637274"/>
                 </a:lnTo>
                 <a:lnTo>
                   <a:pt x="0" y="0"/>
@@ -7384,7 +7429,7 @@
         </p:nvSpPr>
         <p:spPr>
           <a:xfrm flipH="false" flipV="false" rot="0">
-            <a:off x="10762892" y="5899040"/>
+            <a:off x="10193064" y="2330750"/>
             <a:ext cx="2812750" cy="2812750"/>
           </a:xfrm>
           <a:custGeom>
@@ -7399,13 +7444,13 @@
                   <a:pt x="0" y="0"/>
                 </a:moveTo>
                 <a:lnTo>
-                  <a:pt x="2812750" y="0"/>
-                </a:lnTo>
-                <a:lnTo>
-                  <a:pt x="2812750" y="2812749"/>
-                </a:lnTo>
-                <a:lnTo>
-                  <a:pt x="0" y="2812749"/>
+                  <a:pt x="2812749" y="0"/>
+                </a:lnTo>
+                <a:lnTo>
+                  <a:pt x="2812749" y="2812750"/>
+                </a:lnTo>
+                <a:lnTo>
+                  <a:pt x="0" y="2812750"/>
                 </a:lnTo>
                 <a:lnTo>
                   <a:pt x="0" y="0"/>
@@ -7430,7 +7475,7 @@
         </p:nvSpPr>
         <p:spPr>
           <a:xfrm flipH="false" flipV="false" rot="0">
-            <a:off x="14448348" y="2820003"/>
+            <a:off x="15385392" y="2330750"/>
             <a:ext cx="1972073" cy="1972073"/>
           </a:xfrm>
           <a:custGeom>
@@ -7448,10 +7493,10 @@
                   <a:pt x="1972073" y="0"/>
                 </a:lnTo>
                 <a:lnTo>
-                  <a:pt x="1972073" y="1972073"/>
-                </a:lnTo>
-                <a:lnTo>
-                  <a:pt x="0" y="1972073"/>
+                  <a:pt x="1972073" y="1972074"/>
+                </a:lnTo>
+                <a:lnTo>
+                  <a:pt x="0" y="1972074"/>
                 </a:lnTo>
                 <a:lnTo>
                   <a:pt x="0" y="0"/>
@@ -7476,7 +7521,7 @@
         </p:nvSpPr>
         <p:spPr>
           <a:xfrm flipH="true" flipV="false" rot="0">
-            <a:off x="7296983" y="2820003"/>
+            <a:off x="7811678" y="7093324"/>
             <a:ext cx="2690491" cy="2690491"/>
           </a:xfrm>
           <a:custGeom>
@@ -7568,7 +7613,7 @@
         </p:nvSpPr>
         <p:spPr>
           <a:xfrm flipH="false" flipV="false" rot="0">
-            <a:off x="2777098" y="5666889"/>
+            <a:off x="2940973" y="5867275"/>
             <a:ext cx="2330236" cy="2571295"/>
           </a:xfrm>
           <a:custGeom>
@@ -7583,10 +7628,10 @@
                   <a:pt x="0" y="0"/>
                 </a:moveTo>
                 <a:lnTo>
-                  <a:pt x="2330236" y="0"/>
-                </a:lnTo>
-                <a:lnTo>
-                  <a:pt x="2330236" y="2571295"/>
+                  <a:pt x="2330235" y="0"/>
+                </a:lnTo>
+                <a:lnTo>
+                  <a:pt x="2330235" y="2571295"/>
                 </a:lnTo>
                 <a:lnTo>
                   <a:pt x="0" y="2571295"/>
@@ -7608,7 +7653,155 @@
       </p:sp>
       <p:sp>
         <p:nvSpPr>
-          <p:cNvPr name="TextBox 18" id="18"/>
+          <p:cNvPr name="AutoShape 18" id="18"/>
+          <p:cNvSpPr/>
+          <p:nvPr/>
+        </p:nvSpPr>
+        <p:spPr>
+          <a:xfrm>
+            <a:off x="5678478" y="8238184"/>
+            <a:ext cx="2352700" cy="696119"/>
+          </a:xfrm>
+          <a:prstGeom prst="line">
+            <a:avLst/>
+          </a:prstGeom>
+          <a:ln cap="flat" w="114300">
+            <a:solidFill>
+              <a:srgbClr val="000000"/>
+            </a:solidFill>
+            <a:prstDash val="solid"/>
+            <a:headEnd type="none" len="sm" w="sm"/>
+            <a:tailEnd type="arrow" len="sm" w="med"/>
+          </a:ln>
+        </p:spPr>
+      </p:sp>
+      <p:sp>
+        <p:nvSpPr>
+          <p:cNvPr name="AutoShape 19" id="19"/>
+          <p:cNvSpPr/>
+          <p:nvPr/>
+        </p:nvSpPr>
+        <p:spPr>
+          <a:xfrm flipV="true">
+            <a:off x="9733586" y="5245361"/>
+            <a:ext cx="1813915" cy="2289554"/>
+          </a:xfrm>
+          <a:prstGeom prst="line">
+            <a:avLst/>
+          </a:prstGeom>
+          <a:ln cap="flat" w="114300">
+            <a:solidFill>
+              <a:srgbClr val="000000"/>
+            </a:solidFill>
+            <a:prstDash val="solid"/>
+            <a:headEnd type="arrow" len="sm" w="med"/>
+            <a:tailEnd type="arrow" len="sm" w="med"/>
+          </a:ln>
+        </p:spPr>
+      </p:sp>
+      <p:sp>
+        <p:nvSpPr>
+          <p:cNvPr name="AutoShape 20" id="20"/>
+          <p:cNvSpPr/>
+          <p:nvPr/>
+        </p:nvSpPr>
+        <p:spPr>
+          <a:xfrm>
+            <a:off x="12650334" y="3316787"/>
+            <a:ext cx="2735058" cy="0"/>
+          </a:xfrm>
+          <a:prstGeom prst="line">
+            <a:avLst/>
+          </a:prstGeom>
+          <a:ln cap="flat" w="114300">
+            <a:solidFill>
+              <a:srgbClr val="000000"/>
+            </a:solidFill>
+            <a:prstDash val="solid"/>
+            <a:headEnd type="arrow" len="sm" w="med"/>
+            <a:tailEnd type="arrow" len="sm" w="med"/>
+          </a:ln>
+        </p:spPr>
+      </p:sp>
+      <p:sp>
+        <p:nvSpPr>
+          <p:cNvPr name="AutoShape 21" id="21"/>
+          <p:cNvSpPr/>
+          <p:nvPr/>
+        </p:nvSpPr>
+        <p:spPr>
+          <a:xfrm flipV="true">
+            <a:off x="10193064" y="8325362"/>
+            <a:ext cx="3764953" cy="608940"/>
+          </a:xfrm>
+          <a:prstGeom prst="line">
+            <a:avLst/>
+          </a:prstGeom>
+          <a:ln cap="flat" w="114300">
+            <a:solidFill>
+              <a:srgbClr val="000000"/>
+            </a:solidFill>
+            <a:prstDash val="solid"/>
+            <a:headEnd type="none" len="sm" w="sm"/>
+            <a:tailEnd type="arrow" len="sm" w="med"/>
+          </a:ln>
+        </p:spPr>
+      </p:sp>
+      <p:sp>
+        <p:nvSpPr>
+          <p:cNvPr name="Freeform 22" id="22"/>
+          <p:cNvSpPr/>
+          <p:nvPr/>
+        </p:nvSpPr>
+        <p:spPr>
+          <a:xfrm flipH="false" flipV="false" rot="4180980">
+            <a:off x="13813746" y="5928177"/>
+            <a:ext cx="3874596" cy="3757492"/>
+          </a:xfrm>
+          <a:custGeom>
+            <a:avLst/>
+            <a:gdLst/>
+            <a:ahLst/>
+            <a:cxnLst/>
+            <a:rect r="r" b="b" t="t" l="l"/>
+            <a:pathLst>
+              <a:path h="3757492" w="3874596">
+                <a:moveTo>
+                  <a:pt x="0" y="0"/>
+                </a:moveTo>
+                <a:lnTo>
+                  <a:pt x="3874596" y="0"/>
+                </a:lnTo>
+                <a:lnTo>
+                  <a:pt x="3874596" y="3757492"/>
+                </a:lnTo>
+                <a:lnTo>
+                  <a:pt x="0" y="3757492"/>
+                </a:lnTo>
+                <a:lnTo>
+                  <a:pt x="0" y="0"/>
+                </a:lnTo>
+                <a:close/>
+              </a:path>
+            </a:pathLst>
+          </a:custGeom>
+          <a:blipFill>
+            <a:blip r:embed="rId14">
+              <a:extLst>
+                <a:ext uri="{96DAC541-7B7A-43D3-8B79-37D633B846F1}">
+                  <asvg:svgBlip xmlns:asvg="http://schemas.microsoft.com/office/drawing/2016/SVG/main" r:embed="rId15"/>
+                </a:ext>
+              </a:extLst>
+            </a:blip>
+            <a:stretch>
+              <a:fillRect l="0" t="0" r="0" b="0"/>
+            </a:stretch>
+          </a:blipFill>
+        </p:spPr>
+      </p:sp>
+      <p:sp>
+        <p:nvSpPr>
+          <p:cNvPr name="TextBox 23" id="23"/>
           <p:cNvSpPr txBox="true"/>
           <p:nvPr/>
         </p:nvSpPr>
@@ -7649,75 +7842,167 @@
       </p:sp>
       <p:sp>
         <p:nvSpPr>
-          <p:cNvPr name="AutoShape 19" id="19"/>
-          <p:cNvSpPr/>
-          <p:nvPr/>
-        </p:nvSpPr>
-        <p:spPr>
-          <a:xfrm flipV="true">
-            <a:off x="6203006" y="4969142"/>
-            <a:ext cx="1653814" cy="392305"/>
-          </a:xfrm>
-          <a:prstGeom prst="line">
+          <p:cNvPr name="TextBox 24" id="24"/>
+          <p:cNvSpPr txBox="true"/>
+          <p:nvPr/>
+        </p:nvSpPr>
+        <p:spPr>
+          <a:xfrm rot="0">
+            <a:off x="2258215" y="2332940"/>
+            <a:ext cx="2728488" cy="707425"/>
+          </a:xfrm>
+          <a:prstGeom prst="rect">
             <a:avLst/>
           </a:prstGeom>
-          <a:ln cap="flat" w="114300">
-            <a:solidFill>
-              <a:srgbClr val="000000"/>
-            </a:solidFill>
-            <a:prstDash val="solid"/>
-            <a:headEnd type="none" len="sm" w="sm"/>
-            <a:tailEnd type="arrow" len="sm" w="med"/>
-          </a:ln>
-        </p:spPr>
-      </p:sp>
-      <p:sp>
-        <p:nvSpPr>
-          <p:cNvPr name="AutoShape 20" id="20"/>
-          <p:cNvSpPr/>
-          <p:nvPr/>
-        </p:nvSpPr>
-        <p:spPr>
-          <a:xfrm>
-            <a:off x="9493845" y="5245361"/>
-            <a:ext cx="1704942" cy="621914"/>
-          </a:xfrm>
-          <a:prstGeom prst="line">
+        </p:spPr>
+        <p:txBody>
+          <a:bodyPr anchor="t" rtlCol="false" tIns="0" lIns="0" bIns="0" rIns="0">
+            <a:spAutoFit/>
+          </a:bodyPr>
+          <a:lstStyle/>
+          <a:p>
+            <a:pPr algn="l">
+              <a:lnSpc>
+                <a:spcPts val="5746"/>
+              </a:lnSpc>
+            </a:pPr>
+            <a:r>
+              <a:rPr lang="en-US" sz="3805" spc="178">
+                <a:solidFill>
+                  <a:srgbClr val="000000"/>
+                </a:solidFill>
+                <a:latin typeface="Ahkio Thin"/>
+                <a:ea typeface="Ahkio Thin"/>
+                <a:cs typeface="Ahkio Thin"/>
+                <a:sym typeface="Ahkio Thin"/>
+              </a:rPr>
+              <a:t>Tomografías</a:t>
+            </a:r>
+          </a:p>
+        </p:txBody>
+      </p:sp>
+      <p:sp>
+        <p:nvSpPr>
+          <p:cNvPr name="TextBox 25" id="25"/>
+          <p:cNvSpPr txBox="true"/>
+          <p:nvPr/>
+        </p:nvSpPr>
+        <p:spPr>
+          <a:xfrm rot="0">
+            <a:off x="16193461" y="4261718"/>
+            <a:ext cx="679785" cy="707425"/>
+          </a:xfrm>
+          <a:prstGeom prst="rect">
             <a:avLst/>
           </a:prstGeom>
-          <a:ln cap="flat" w="114300">
-            <a:solidFill>
-              <a:srgbClr val="000000"/>
-            </a:solidFill>
-            <a:prstDash val="solid"/>
-            <a:headEnd type="arrow" len="sm" w="med"/>
-            <a:tailEnd type="arrow" len="sm" w="med"/>
-          </a:ln>
-        </p:spPr>
-      </p:sp>
-      <p:sp>
-        <p:nvSpPr>
-          <p:cNvPr name="AutoShape 21" id="21"/>
-          <p:cNvSpPr/>
-          <p:nvPr/>
-        </p:nvSpPr>
-        <p:spPr>
-          <a:xfrm flipV="true">
-            <a:off x="13133399" y="4515840"/>
-            <a:ext cx="1595968" cy="1383200"/>
-          </a:xfrm>
-          <a:prstGeom prst="line">
+        </p:spPr>
+        <p:txBody>
+          <a:bodyPr anchor="t" rtlCol="false" tIns="0" lIns="0" bIns="0" rIns="0">
+            <a:spAutoFit/>
+          </a:bodyPr>
+          <a:lstStyle/>
+          <a:p>
+            <a:pPr algn="l">
+              <a:lnSpc>
+                <a:spcPts val="5746"/>
+              </a:lnSpc>
+            </a:pPr>
+            <a:r>
+              <a:rPr lang="en-US" sz="3805" spc="178">
+                <a:solidFill>
+                  <a:srgbClr val="000000"/>
+                </a:solidFill>
+                <a:latin typeface="Ahkio Thin"/>
+                <a:ea typeface="Ahkio Thin"/>
+                <a:cs typeface="Ahkio Thin"/>
+                <a:sym typeface="Ahkio Thin"/>
+              </a:rPr>
+              <a:t>IA</a:t>
+            </a:r>
+          </a:p>
+        </p:txBody>
+      </p:sp>
+      <p:sp>
+        <p:nvSpPr>
+          <p:cNvPr name="TextBox 26" id="26"/>
+          <p:cNvSpPr txBox="true"/>
+          <p:nvPr/>
+        </p:nvSpPr>
+        <p:spPr>
+          <a:xfrm rot="0">
+            <a:off x="15237138" y="6050030"/>
+            <a:ext cx="831241" cy="1579598"/>
+          </a:xfrm>
+          <a:prstGeom prst="rect">
             <a:avLst/>
           </a:prstGeom>
-          <a:ln cap="flat" w="114300">
-            <a:solidFill>
-              <a:srgbClr val="000000"/>
-            </a:solidFill>
-            <a:prstDash val="solid"/>
-            <a:headEnd type="arrow" len="sm" w="med"/>
-            <a:tailEnd type="arrow" len="sm" w="med"/>
-          </a:ln>
-        </p:spPr>
+        </p:spPr>
+        <p:txBody>
+          <a:bodyPr anchor="t" rtlCol="false" tIns="0" lIns="0" bIns="0" rIns="0">
+            <a:spAutoFit/>
+          </a:bodyPr>
+          <a:lstStyle/>
+          <a:p>
+            <a:pPr algn="l">
+              <a:lnSpc>
+                <a:spcPts val="12843"/>
+              </a:lnSpc>
+            </a:pPr>
+            <a:r>
+              <a:rPr lang="en-US" sz="8505" spc="399" b="true">
+                <a:solidFill>
+                  <a:srgbClr val="000000"/>
+                </a:solidFill>
+                <a:latin typeface="Ahkio Heavy"/>
+                <a:ea typeface="Ahkio Heavy"/>
+                <a:cs typeface="Ahkio Heavy"/>
+                <a:sym typeface="Ahkio Heavy"/>
+              </a:rPr>
+              <a:t>%</a:t>
+            </a:r>
+          </a:p>
+        </p:txBody>
+      </p:sp>
+      <p:sp>
+        <p:nvSpPr>
+          <p:cNvPr name="TextBox 27" id="27"/>
+          <p:cNvSpPr txBox="true"/>
+          <p:nvPr/>
+        </p:nvSpPr>
+        <p:spPr>
+          <a:xfrm rot="0">
+            <a:off x="14510862" y="7598509"/>
+            <a:ext cx="2283792" cy="1584872"/>
+          </a:xfrm>
+          <a:prstGeom prst="rect">
+            <a:avLst/>
+          </a:prstGeom>
+        </p:spPr>
+        <p:txBody>
+          <a:bodyPr anchor="t" rtlCol="false" tIns="0" lIns="0" bIns="0" rIns="0">
+            <a:spAutoFit/>
+          </a:bodyPr>
+          <a:lstStyle/>
+          <a:p>
+            <a:pPr algn="ctr">
+              <a:lnSpc>
+                <a:spcPts val="4237"/>
+              </a:lnSpc>
+            </a:pPr>
+            <a:r>
+              <a:rPr lang="en-US" b="true" sz="2805" spc="131">
+                <a:solidFill>
+                  <a:srgbClr val="000000"/>
+                </a:solidFill>
+                <a:latin typeface="Ahkio Bold"/>
+                <a:ea typeface="Ahkio Bold"/>
+                <a:cs typeface="Ahkio Bold"/>
+                <a:sym typeface="Ahkio Bold"/>
+              </a:rPr>
+              <a:t>predicción en detección del CCR</a:t>
+            </a:r>
+          </a:p>
+        </p:txBody>
       </p:sp>
     </p:spTree>
   </p:cSld>

</xml_diff>